<commit_message>
Added ssystem feature list and contexxt diagram.
</commit_message>
<xml_diff>
--- a/doc/GTAS Architecture & Design.pptx
+++ b/doc/GTAS Architecture & Design.pptx
@@ -8,6 +8,10 @@
     <p:sldId id="256" r:id="rId2"/>
     <p:sldId id="257" r:id="rId3"/>
     <p:sldId id="258" r:id="rId4"/>
+    <p:sldId id="259" r:id="rId5"/>
+    <p:sldId id="260" r:id="rId6"/>
+    <p:sldId id="261" r:id="rId7"/>
+    <p:sldId id="262" r:id="rId8"/>
   </p:sldIdLst>
   <p:sldSz cx="9144000" cy="6858000" type="screen4x3"/>
   <p:notesSz cx="6858000" cy="9144000"/>
@@ -290,7 +294,7 @@
           <a:p>
             <a:fld id="{6344C6FC-68EA-4844-9DB9-2E28221C8BC0}" type="datetimeFigureOut">
               <a:rPr lang="en-US" smtClean="0"/>
-              <a:t>6/3/2015</a:t>
+              <a:t>6/9/2015</a:t>
             </a:fld>
             <a:endParaRPr lang="en-US"/>
           </a:p>
@@ -460,7 +464,7 @@
           <a:p>
             <a:fld id="{6344C6FC-68EA-4844-9DB9-2E28221C8BC0}" type="datetimeFigureOut">
               <a:rPr lang="en-US" smtClean="0"/>
-              <a:t>6/3/2015</a:t>
+              <a:t>6/9/2015</a:t>
             </a:fld>
             <a:endParaRPr lang="en-US"/>
           </a:p>
@@ -640,7 +644,7 @@
           <a:p>
             <a:fld id="{6344C6FC-68EA-4844-9DB9-2E28221C8BC0}" type="datetimeFigureOut">
               <a:rPr lang="en-US" smtClean="0"/>
-              <a:t>6/3/2015</a:t>
+              <a:t>6/9/2015</a:t>
             </a:fld>
             <a:endParaRPr lang="en-US"/>
           </a:p>
@@ -810,7 +814,7 @@
           <a:p>
             <a:fld id="{6344C6FC-68EA-4844-9DB9-2E28221C8BC0}" type="datetimeFigureOut">
               <a:rPr lang="en-US" smtClean="0"/>
-              <a:t>6/3/2015</a:t>
+              <a:t>6/9/2015</a:t>
             </a:fld>
             <a:endParaRPr lang="en-US"/>
           </a:p>
@@ -1056,7 +1060,7 @@
           <a:p>
             <a:fld id="{6344C6FC-68EA-4844-9DB9-2E28221C8BC0}" type="datetimeFigureOut">
               <a:rPr lang="en-US" smtClean="0"/>
-              <a:t>6/3/2015</a:t>
+              <a:t>6/9/2015</a:t>
             </a:fld>
             <a:endParaRPr lang="en-US"/>
           </a:p>
@@ -1344,7 +1348,7 @@
           <a:p>
             <a:fld id="{6344C6FC-68EA-4844-9DB9-2E28221C8BC0}" type="datetimeFigureOut">
               <a:rPr lang="en-US" smtClean="0"/>
-              <a:t>6/3/2015</a:t>
+              <a:t>6/9/2015</a:t>
             </a:fld>
             <a:endParaRPr lang="en-US"/>
           </a:p>
@@ -1766,7 +1770,7 @@
           <a:p>
             <a:fld id="{6344C6FC-68EA-4844-9DB9-2E28221C8BC0}" type="datetimeFigureOut">
               <a:rPr lang="en-US" smtClean="0"/>
-              <a:t>6/3/2015</a:t>
+              <a:t>6/9/2015</a:t>
             </a:fld>
             <a:endParaRPr lang="en-US"/>
           </a:p>
@@ -1884,7 +1888,7 @@
           <a:p>
             <a:fld id="{6344C6FC-68EA-4844-9DB9-2E28221C8BC0}" type="datetimeFigureOut">
               <a:rPr lang="en-US" smtClean="0"/>
-              <a:t>6/3/2015</a:t>
+              <a:t>6/9/2015</a:t>
             </a:fld>
             <a:endParaRPr lang="en-US"/>
           </a:p>
@@ -1979,7 +1983,7 @@
           <a:p>
             <a:fld id="{6344C6FC-68EA-4844-9DB9-2E28221C8BC0}" type="datetimeFigureOut">
               <a:rPr lang="en-US" smtClean="0"/>
-              <a:t>6/3/2015</a:t>
+              <a:t>6/9/2015</a:t>
             </a:fld>
             <a:endParaRPr lang="en-US"/>
           </a:p>
@@ -2256,7 +2260,7 @@
           <a:p>
             <a:fld id="{6344C6FC-68EA-4844-9DB9-2E28221C8BC0}" type="datetimeFigureOut">
               <a:rPr lang="en-US" smtClean="0"/>
-              <a:t>6/3/2015</a:t>
+              <a:t>6/9/2015</a:t>
             </a:fld>
             <a:endParaRPr lang="en-US"/>
           </a:p>
@@ -2509,7 +2513,7 @@
           <a:p>
             <a:fld id="{6344C6FC-68EA-4844-9DB9-2E28221C8BC0}" type="datetimeFigureOut">
               <a:rPr lang="en-US" smtClean="0"/>
-              <a:t>6/3/2015</a:t>
+              <a:t>6/9/2015</a:t>
             </a:fld>
             <a:endParaRPr lang="en-US"/>
           </a:p>
@@ -2722,7 +2726,7 @@
           <a:p>
             <a:fld id="{6344C6FC-68EA-4844-9DB9-2E28221C8BC0}" type="datetimeFigureOut">
               <a:rPr lang="en-US" smtClean="0"/>
-              <a:t>6/3/2015</a:t>
+              <a:t>6/9/2015</a:t>
             </a:fld>
             <a:endParaRPr lang="en-US"/>
           </a:p>
@@ -3270,7 +3274,27 @@
             <a:pPr algn="ctr"/>
             <a:r>
               <a:rPr lang="en-US" dirty="0" smtClean="0"/>
-              <a:t>HTMT5, CSS/SASS, Angular.js (1.x), JQUERY (2.x), Zepto.js, Bootstrap.js, ng-table.js, [Query Builder ?]</a:t>
+              <a:t>HTML 5, </a:t>
+            </a:r>
+            <a:r>
+              <a:rPr lang="en-US" dirty="0" smtClean="0"/>
+              <a:t>CSS/SASS, </a:t>
+            </a:r>
+            <a:r>
+              <a:rPr lang="en-US" dirty="0" smtClean="0"/>
+              <a:t>AngularJS </a:t>
+            </a:r>
+            <a:r>
+              <a:rPr lang="en-US" dirty="0" smtClean="0"/>
+              <a:t>(1.x), JQUERY (2.x), Zepto.js, </a:t>
+            </a:r>
+            <a:r>
+              <a:rPr lang="en-US" dirty="0" smtClean="0"/>
+              <a:t>Bootstrap, </a:t>
+            </a:r>
+            <a:r>
+              <a:rPr lang="en-US" dirty="0" smtClean="0"/>
+              <a:t>[Query Builder ?]</a:t>
             </a:r>
             <a:endParaRPr lang="en-US" dirty="0"/>
           </a:p>
@@ -3727,6 +3751,11 @@
               <a:rPr lang="en-US" dirty="0" smtClean="0"/>
               <a:t> </a:t>
             </a:r>
+            <a:r>
+              <a:rPr lang="en-US" dirty="0" smtClean="0"/>
+              <a:t>(Primary)</a:t>
+            </a:r>
+            <a:endParaRPr lang="en-US" dirty="0" smtClean="0"/>
           </a:p>
           <a:p>
             <a:pPr algn="ctr"/>
@@ -3785,6 +3814,10 @@
             <a:r>
               <a:rPr lang="en-US" dirty="0" err="1" smtClean="0"/>
               <a:t>MariaDB</a:t>
+            </a:r>
+            <a:r>
+              <a:rPr lang="en-US" dirty="0" smtClean="0"/>
+              <a:t>(Secondary)</a:t>
             </a:r>
             <a:endParaRPr lang="en-US" dirty="0" smtClean="0"/>
           </a:p>
@@ -4387,6 +4420,1299 @@
     <p:extLst>
       <p:ext uri="{BB962C8B-B14F-4D97-AF65-F5344CB8AC3E}">
         <p14:creationId xmlns:p14="http://schemas.microsoft.com/office/powerpoint/2010/main" val="94522114"/>
+      </p:ext>
+    </p:extLst>
+  </p:cSld>
+  <p:clrMapOvr>
+    <a:masterClrMapping/>
+  </p:clrMapOvr>
+  <p:timing>
+    <p:tnLst>
+      <p:par>
+        <p:cTn id="1" dur="indefinite" restart="never" nodeType="tmRoot"/>
+      </p:par>
+    </p:tnLst>
+  </p:timing>
+</p:sld>
+</file>
+
+<file path=ppt/slides/slide4.xml><?xml version="1.0" encoding="utf-8"?>
+<p:sld xmlns:a="http://schemas.openxmlformats.org/drawingml/2006/main" xmlns:r="http://schemas.openxmlformats.org/officeDocument/2006/relationships" xmlns:p="http://schemas.openxmlformats.org/presentationml/2006/main">
+  <p:cSld>
+    <p:spTree>
+      <p:nvGrpSpPr>
+        <p:cNvPr id="1" name=""/>
+        <p:cNvGrpSpPr/>
+        <p:nvPr/>
+      </p:nvGrpSpPr>
+      <p:grpSpPr>
+        <a:xfrm>
+          <a:off x="0" y="0"/>
+          <a:ext cx="0" cy="0"/>
+          <a:chOff x="0" y="0"/>
+          <a:chExt cx="0" cy="0"/>
+        </a:xfrm>
+      </p:grpSpPr>
+      <p:sp>
+        <p:nvSpPr>
+          <p:cNvPr id="2" name="Title 1"/>
+          <p:cNvSpPr>
+            <a:spLocks noGrp="1"/>
+          </p:cNvSpPr>
+          <p:nvPr>
+            <p:ph type="title"/>
+          </p:nvPr>
+        </p:nvSpPr>
+        <p:spPr/>
+        <p:txBody>
+          <a:bodyPr/>
+          <a:lstStyle/>
+          <a:p>
+            <a:r>
+              <a:rPr lang="en-US" dirty="0" smtClean="0"/>
+              <a:t>System Feature Overview</a:t>
+            </a:r>
+            <a:endParaRPr lang="en-US" dirty="0"/>
+          </a:p>
+        </p:txBody>
+      </p:sp>
+      <p:sp>
+        <p:nvSpPr>
+          <p:cNvPr id="3" name="Content Placeholder 2"/>
+          <p:cNvSpPr>
+            <a:spLocks noGrp="1"/>
+          </p:cNvSpPr>
+          <p:nvPr>
+            <p:ph idx="1"/>
+          </p:nvPr>
+        </p:nvSpPr>
+        <p:spPr/>
+        <p:txBody>
+          <a:bodyPr>
+            <a:normAutofit fontScale="92500" lnSpcReduction="20000"/>
+          </a:bodyPr>
+          <a:lstStyle/>
+          <a:p>
+            <a:pPr marL="514350" indent="-514350">
+              <a:buFont typeface="+mj-lt"/>
+              <a:buAutoNum type="arabicPeriod"/>
+            </a:pPr>
+            <a:r>
+              <a:rPr lang="en-US" dirty="0" smtClean="0"/>
+              <a:t>Parsers</a:t>
+            </a:r>
+          </a:p>
+          <a:p>
+            <a:pPr marL="914400" lvl="1" indent="-514350"/>
+            <a:r>
+              <a:rPr lang="en-US" dirty="0" smtClean="0"/>
+              <a:t>API</a:t>
+            </a:r>
+          </a:p>
+          <a:p>
+            <a:pPr marL="914400" lvl="1" indent="-514350"/>
+            <a:r>
+              <a:rPr lang="en-US" dirty="0" smtClean="0"/>
+              <a:t>PNR</a:t>
+            </a:r>
+          </a:p>
+          <a:p>
+            <a:pPr marL="514350" indent="-514350">
+              <a:buFont typeface="+mj-lt"/>
+              <a:buAutoNum type="arabicPeriod"/>
+            </a:pPr>
+            <a:r>
+              <a:rPr lang="en-US" dirty="0" smtClean="0"/>
+              <a:t>Targeting Service – Rule Engine (Real-time Transactions)</a:t>
+            </a:r>
+          </a:p>
+          <a:p>
+            <a:pPr marL="514350" indent="-514350">
+              <a:buFont typeface="+mj-lt"/>
+              <a:buAutoNum type="arabicPeriod"/>
+            </a:pPr>
+            <a:r>
+              <a:rPr lang="en-US" dirty="0" smtClean="0"/>
+              <a:t>UDR – Rule Management (UI + Backend)</a:t>
+            </a:r>
+          </a:p>
+          <a:p>
+            <a:pPr marL="514350" indent="-514350">
+              <a:buFont typeface="+mj-lt"/>
+              <a:buAutoNum type="arabicPeriod"/>
+            </a:pPr>
+            <a:r>
+              <a:rPr lang="en-US" dirty="0" smtClean="0"/>
+              <a:t>Query Builder - </a:t>
+            </a:r>
+            <a:r>
+              <a:rPr lang="en-US" dirty="0" err="1" smtClean="0"/>
+              <a:t>UI+Backend</a:t>
+            </a:r>
+            <a:r>
+              <a:rPr lang="en-US" dirty="0"/>
+              <a:t> </a:t>
+            </a:r>
+            <a:r>
+              <a:rPr lang="en-US" dirty="0" smtClean="0"/>
+              <a:t>for current/historical data</a:t>
+            </a:r>
+          </a:p>
+          <a:p>
+            <a:pPr marL="514350" indent="-514350">
+              <a:buFont typeface="+mj-lt"/>
+              <a:buAutoNum type="arabicPeriod"/>
+            </a:pPr>
+            <a:r>
+              <a:rPr lang="en-US" dirty="0" smtClean="0"/>
+              <a:t>Flight/Passenger UI – Analyst’s view of current flights</a:t>
+            </a:r>
+            <a:endParaRPr lang="en-US" dirty="0"/>
+          </a:p>
+        </p:txBody>
+      </p:sp>
+    </p:spTree>
+    <p:extLst>
+      <p:ext uri="{BB962C8B-B14F-4D97-AF65-F5344CB8AC3E}">
+        <p14:creationId xmlns:p14="http://schemas.microsoft.com/office/powerpoint/2010/main" val="931954362"/>
+      </p:ext>
+    </p:extLst>
+  </p:cSld>
+  <p:clrMapOvr>
+    <a:masterClrMapping/>
+  </p:clrMapOvr>
+  <p:timing>
+    <p:tnLst>
+      <p:par>
+        <p:cTn id="1" dur="indefinite" restart="never" nodeType="tmRoot"/>
+      </p:par>
+    </p:tnLst>
+  </p:timing>
+</p:sld>
+</file>
+
+<file path=ppt/slides/slide5.xml><?xml version="1.0" encoding="utf-8"?>
+<p:sld xmlns:a="http://schemas.openxmlformats.org/drawingml/2006/main" xmlns:r="http://schemas.openxmlformats.org/officeDocument/2006/relationships" xmlns:p="http://schemas.openxmlformats.org/presentationml/2006/main">
+  <p:cSld>
+    <p:spTree>
+      <p:nvGrpSpPr>
+        <p:cNvPr id="1" name=""/>
+        <p:cNvGrpSpPr/>
+        <p:nvPr/>
+      </p:nvGrpSpPr>
+      <p:grpSpPr>
+        <a:xfrm>
+          <a:off x="0" y="0"/>
+          <a:ext cx="0" cy="0"/>
+          <a:chOff x="0" y="0"/>
+          <a:chExt cx="0" cy="0"/>
+        </a:xfrm>
+      </p:grpSpPr>
+      <p:sp>
+        <p:nvSpPr>
+          <p:cNvPr id="2" name="Title 1"/>
+          <p:cNvSpPr>
+            <a:spLocks noGrp="1"/>
+          </p:cNvSpPr>
+          <p:nvPr>
+            <p:ph type="title"/>
+          </p:nvPr>
+        </p:nvSpPr>
+        <p:spPr/>
+        <p:txBody>
+          <a:bodyPr>
+            <a:normAutofit fontScale="90000"/>
+          </a:bodyPr>
+          <a:lstStyle/>
+          <a:p>
+            <a:r>
+              <a:rPr lang="en-US" dirty="0"/>
+              <a:t>System Feature </a:t>
+            </a:r>
+            <a:r>
+              <a:rPr lang="en-US" dirty="0" smtClean="0"/>
+              <a:t>Overview (continued)</a:t>
+            </a:r>
+            <a:endParaRPr lang="en-US" dirty="0"/>
+          </a:p>
+        </p:txBody>
+      </p:sp>
+      <p:sp>
+        <p:nvSpPr>
+          <p:cNvPr id="3" name="Content Placeholder 2"/>
+          <p:cNvSpPr>
+            <a:spLocks noGrp="1"/>
+          </p:cNvSpPr>
+          <p:nvPr>
+            <p:ph idx="1"/>
+          </p:nvPr>
+        </p:nvSpPr>
+        <p:spPr/>
+        <p:txBody>
+          <a:bodyPr/>
+          <a:lstStyle/>
+          <a:p>
+            <a:pPr marL="514350" indent="-514350">
+              <a:buFont typeface="+mj-lt"/>
+              <a:buAutoNum type="arabicPeriod" startAt="6"/>
+            </a:pPr>
+            <a:r>
+              <a:rPr lang="en-US" dirty="0" smtClean="0"/>
+              <a:t>Watch-list Engine – current flights</a:t>
+            </a:r>
+          </a:p>
+          <a:p>
+            <a:pPr marL="514350" indent="-514350">
+              <a:buFont typeface="+mj-lt"/>
+              <a:buAutoNum type="arabicPeriod" startAt="6"/>
+            </a:pPr>
+            <a:r>
+              <a:rPr lang="en-US" dirty="0" smtClean="0"/>
+              <a:t>Watch-list Manager -  UI + backend (CRUD, import/export)</a:t>
+            </a:r>
+          </a:p>
+          <a:p>
+            <a:pPr marL="514350" indent="-514350">
+              <a:buFont typeface="+mj-lt"/>
+              <a:buAutoNum type="arabicPeriod" startAt="6"/>
+            </a:pPr>
+            <a:r>
+              <a:rPr lang="en-US" dirty="0" smtClean="0"/>
+              <a:t>Administration – users, roles, system configuration</a:t>
+            </a:r>
+          </a:p>
+          <a:p>
+            <a:pPr marL="514350" indent="-514350">
+              <a:buFont typeface="+mj-lt"/>
+              <a:buAutoNum type="arabicPeriod" startAt="6"/>
+            </a:pPr>
+            <a:r>
+              <a:rPr lang="en-US" dirty="0" smtClean="0"/>
+              <a:t>Diagnostics and Audit logging</a:t>
+            </a:r>
+            <a:endParaRPr lang="en-US" dirty="0"/>
+          </a:p>
+        </p:txBody>
+      </p:sp>
+    </p:spTree>
+    <p:extLst>
+      <p:ext uri="{BB962C8B-B14F-4D97-AF65-F5344CB8AC3E}">
+        <p14:creationId xmlns:p14="http://schemas.microsoft.com/office/powerpoint/2010/main" val="2650859877"/>
+      </p:ext>
+    </p:extLst>
+  </p:cSld>
+  <p:clrMapOvr>
+    <a:masterClrMapping/>
+  </p:clrMapOvr>
+  <p:timing>
+    <p:tnLst>
+      <p:par>
+        <p:cTn id="1" dur="indefinite" restart="never" nodeType="tmRoot"/>
+      </p:par>
+    </p:tnLst>
+  </p:timing>
+</p:sld>
+</file>
+
+<file path=ppt/slides/slide6.xml><?xml version="1.0" encoding="utf-8"?>
+<p:sld xmlns:a="http://schemas.openxmlformats.org/drawingml/2006/main" xmlns:r="http://schemas.openxmlformats.org/officeDocument/2006/relationships" xmlns:p="http://schemas.openxmlformats.org/presentationml/2006/main">
+  <p:cSld>
+    <p:spTree>
+      <p:nvGrpSpPr>
+        <p:cNvPr id="1" name=""/>
+        <p:cNvGrpSpPr/>
+        <p:nvPr/>
+      </p:nvGrpSpPr>
+      <p:grpSpPr>
+        <a:xfrm>
+          <a:off x="0" y="0"/>
+          <a:ext cx="0" cy="0"/>
+          <a:chOff x="0" y="0"/>
+          <a:chExt cx="0" cy="0"/>
+        </a:xfrm>
+      </p:grpSpPr>
+      <p:sp>
+        <p:nvSpPr>
+          <p:cNvPr id="2" name="Title 1"/>
+          <p:cNvSpPr>
+            <a:spLocks noGrp="1"/>
+          </p:cNvSpPr>
+          <p:nvPr>
+            <p:ph type="title"/>
+          </p:nvPr>
+        </p:nvSpPr>
+        <p:spPr/>
+        <p:txBody>
+          <a:bodyPr/>
+          <a:lstStyle/>
+          <a:p>
+            <a:r>
+              <a:rPr lang="en-US" dirty="0" smtClean="0"/>
+              <a:t>User Roles</a:t>
+            </a:r>
+            <a:endParaRPr lang="en-US" dirty="0"/>
+          </a:p>
+        </p:txBody>
+      </p:sp>
+      <p:sp>
+        <p:nvSpPr>
+          <p:cNvPr id="3" name="Content Placeholder 2"/>
+          <p:cNvSpPr>
+            <a:spLocks noGrp="1"/>
+          </p:cNvSpPr>
+          <p:nvPr>
+            <p:ph idx="1"/>
+          </p:nvPr>
+        </p:nvSpPr>
+        <p:spPr/>
+        <p:txBody>
+          <a:bodyPr/>
+          <a:lstStyle/>
+          <a:p>
+            <a:r>
+              <a:rPr lang="en-US" dirty="0" smtClean="0"/>
+              <a:t>Admin/Super User</a:t>
+            </a:r>
+          </a:p>
+          <a:p>
+            <a:r>
+              <a:rPr lang="en-US" dirty="0" smtClean="0"/>
+              <a:t>Targeting Analyst</a:t>
+            </a:r>
+          </a:p>
+          <a:p>
+            <a:pPr lvl="1"/>
+            <a:r>
+              <a:rPr lang="en-US" dirty="0" smtClean="0"/>
+              <a:t>Create/Run/Save Queries</a:t>
+            </a:r>
+          </a:p>
+          <a:p>
+            <a:pPr lvl="1"/>
+            <a:r>
+              <a:rPr lang="en-US" dirty="0" smtClean="0"/>
+              <a:t>View Passengers/Flights/Hits</a:t>
+            </a:r>
+            <a:endParaRPr lang="en-US" dirty="0"/>
+          </a:p>
+          <a:p>
+            <a:r>
+              <a:rPr lang="en-US" dirty="0" smtClean="0"/>
+              <a:t>Rule Analyst – Create/Modify/Save rules</a:t>
+            </a:r>
+          </a:p>
+          <a:p>
+            <a:r>
+              <a:rPr lang="en-US" dirty="0" smtClean="0"/>
+              <a:t>Watch list Analyst – create/modify/save WL</a:t>
+            </a:r>
+          </a:p>
+        </p:txBody>
+      </p:sp>
+    </p:spTree>
+    <p:extLst>
+      <p:ext uri="{BB962C8B-B14F-4D97-AF65-F5344CB8AC3E}">
+        <p14:creationId xmlns:p14="http://schemas.microsoft.com/office/powerpoint/2010/main" val="2587821126"/>
+      </p:ext>
+    </p:extLst>
+  </p:cSld>
+  <p:clrMapOvr>
+    <a:masterClrMapping/>
+  </p:clrMapOvr>
+  <p:timing>
+    <p:tnLst>
+      <p:par>
+        <p:cTn id="1" dur="indefinite" restart="never" nodeType="tmRoot"/>
+      </p:par>
+    </p:tnLst>
+  </p:timing>
+</p:sld>
+</file>
+
+<file path=ppt/slides/slide7.xml><?xml version="1.0" encoding="utf-8"?>
+<p:sld xmlns:a="http://schemas.openxmlformats.org/drawingml/2006/main" xmlns:r="http://schemas.openxmlformats.org/officeDocument/2006/relationships" xmlns:p="http://schemas.openxmlformats.org/presentationml/2006/main">
+  <p:cSld>
+    <p:spTree>
+      <p:nvGrpSpPr>
+        <p:cNvPr id="1" name=""/>
+        <p:cNvGrpSpPr/>
+        <p:nvPr/>
+      </p:nvGrpSpPr>
+      <p:grpSpPr>
+        <a:xfrm>
+          <a:off x="0" y="0"/>
+          <a:ext cx="0" cy="0"/>
+          <a:chOff x="0" y="0"/>
+          <a:chExt cx="0" cy="0"/>
+        </a:xfrm>
+      </p:grpSpPr>
+      <p:sp>
+        <p:nvSpPr>
+          <p:cNvPr id="2" name="Title 1"/>
+          <p:cNvSpPr>
+            <a:spLocks noGrp="1"/>
+          </p:cNvSpPr>
+          <p:nvPr>
+            <p:ph type="title"/>
+          </p:nvPr>
+        </p:nvSpPr>
+        <p:spPr/>
+        <p:txBody>
+          <a:bodyPr/>
+          <a:lstStyle/>
+          <a:p>
+            <a:r>
+              <a:rPr lang="en-US" dirty="0" smtClean="0"/>
+              <a:t>System Context Diagram</a:t>
+            </a:r>
+            <a:endParaRPr lang="en-US" dirty="0"/>
+          </a:p>
+        </p:txBody>
+      </p:sp>
+      <p:sp>
+        <p:nvSpPr>
+          <p:cNvPr id="3" name="Content Placeholder 2"/>
+          <p:cNvSpPr>
+            <a:spLocks noGrp="1"/>
+          </p:cNvSpPr>
+          <p:nvPr>
+            <p:ph idx="1"/>
+          </p:nvPr>
+        </p:nvSpPr>
+        <p:spPr/>
+        <p:txBody>
+          <a:bodyPr/>
+          <a:lstStyle/>
+          <a:p>
+            <a:endParaRPr lang="en-US" dirty="0"/>
+          </a:p>
+        </p:txBody>
+      </p:sp>
+      <p:sp>
+        <p:nvSpPr>
+          <p:cNvPr id="4" name="Rectangle 3"/>
+          <p:cNvSpPr/>
+          <p:nvPr/>
+        </p:nvSpPr>
+        <p:spPr>
+          <a:xfrm>
+            <a:off x="1676400" y="1828800"/>
+            <a:ext cx="3657600" cy="1143000"/>
+          </a:xfrm>
+          <a:prstGeom prst="rect">
+            <a:avLst/>
+          </a:prstGeom>
+          <a:solidFill>
+            <a:srgbClr val="FFC000"/>
+          </a:solidFill>
+          <a:scene3d>
+            <a:camera prst="orthographicFront"/>
+            <a:lightRig rig="threePt" dir="t"/>
+          </a:scene3d>
+          <a:sp3d>
+            <a:bevelT/>
+          </a:sp3d>
+        </p:spPr>
+        <p:style>
+          <a:lnRef idx="2">
+            <a:schemeClr val="dk1"/>
+          </a:lnRef>
+          <a:fillRef idx="1">
+            <a:schemeClr val="lt1"/>
+          </a:fillRef>
+          <a:effectRef idx="0">
+            <a:schemeClr val="dk1"/>
+          </a:effectRef>
+          <a:fontRef idx="minor">
+            <a:schemeClr val="dk1"/>
+          </a:fontRef>
+        </p:style>
+        <p:txBody>
+          <a:bodyPr rtlCol="0" anchor="ctr"/>
+          <a:lstStyle/>
+          <a:p>
+            <a:pPr algn="ctr"/>
+            <a:r>
+              <a:rPr lang="en-US" dirty="0" smtClean="0"/>
+              <a:t>UI</a:t>
+            </a:r>
+          </a:p>
+          <a:p>
+            <a:pPr algn="ctr"/>
+            <a:endParaRPr lang="en-US" dirty="0"/>
+          </a:p>
+          <a:p>
+            <a:pPr algn="ctr"/>
+            <a:endParaRPr lang="en-US" dirty="0" smtClean="0"/>
+          </a:p>
+          <a:p>
+            <a:pPr algn="ctr"/>
+            <a:endParaRPr lang="en-US" dirty="0"/>
+          </a:p>
+        </p:txBody>
+      </p:sp>
+      <p:sp>
+        <p:nvSpPr>
+          <p:cNvPr id="5" name="Rectangle 4"/>
+          <p:cNvSpPr/>
+          <p:nvPr/>
+        </p:nvSpPr>
+        <p:spPr>
+          <a:xfrm>
+            <a:off x="1676400" y="3429000"/>
+            <a:ext cx="3733800" cy="2514600"/>
+          </a:xfrm>
+          <a:prstGeom prst="rect">
+            <a:avLst/>
+          </a:prstGeom>
+          <a:solidFill>
+            <a:schemeClr val="accent6">
+              <a:lumMod val="75000"/>
+            </a:schemeClr>
+          </a:solidFill>
+          <a:scene3d>
+            <a:camera prst="orthographicFront"/>
+            <a:lightRig rig="threePt" dir="t"/>
+          </a:scene3d>
+          <a:sp3d>
+            <a:bevelT/>
+          </a:sp3d>
+        </p:spPr>
+        <p:style>
+          <a:lnRef idx="2">
+            <a:schemeClr val="dk1">
+              <a:shade val="50000"/>
+            </a:schemeClr>
+          </a:lnRef>
+          <a:fillRef idx="1">
+            <a:schemeClr val="dk1"/>
+          </a:fillRef>
+          <a:effectRef idx="0">
+            <a:schemeClr val="dk1"/>
+          </a:effectRef>
+          <a:fontRef idx="minor">
+            <a:schemeClr val="lt1"/>
+          </a:fontRef>
+        </p:style>
+        <p:txBody>
+          <a:bodyPr rtlCol="0" anchor="ctr"/>
+          <a:lstStyle/>
+          <a:p>
+            <a:pPr algn="ctr"/>
+            <a:r>
+              <a:rPr lang="en-US" dirty="0" smtClean="0"/>
+              <a:t>Backend</a:t>
+            </a:r>
+          </a:p>
+          <a:p>
+            <a:pPr algn="ctr"/>
+            <a:endParaRPr lang="en-US" dirty="0" smtClean="0"/>
+          </a:p>
+          <a:p>
+            <a:pPr algn="ctr"/>
+            <a:endParaRPr lang="en-US" dirty="0" smtClean="0"/>
+          </a:p>
+          <a:p>
+            <a:pPr algn="ctr"/>
+            <a:endParaRPr lang="en-US" dirty="0"/>
+          </a:p>
+          <a:p>
+            <a:pPr algn="ctr"/>
+            <a:endParaRPr lang="en-US" dirty="0" smtClean="0"/>
+          </a:p>
+          <a:p>
+            <a:pPr algn="ctr"/>
+            <a:endParaRPr lang="en-US" dirty="0"/>
+          </a:p>
+          <a:p>
+            <a:pPr algn="ctr"/>
+            <a:endParaRPr lang="en-US" dirty="0" smtClean="0"/>
+          </a:p>
+          <a:p>
+            <a:pPr algn="ctr"/>
+            <a:endParaRPr lang="en-US" dirty="0"/>
+          </a:p>
+          <a:p>
+            <a:pPr algn="ctr"/>
+            <a:endParaRPr lang="en-US" dirty="0"/>
+          </a:p>
+        </p:txBody>
+      </p:sp>
+      <p:sp>
+        <p:nvSpPr>
+          <p:cNvPr id="6" name="Can 5"/>
+          <p:cNvSpPr/>
+          <p:nvPr/>
+        </p:nvSpPr>
+        <p:spPr>
+          <a:xfrm>
+            <a:off x="6477000" y="4724400"/>
+            <a:ext cx="990600" cy="914400"/>
+          </a:xfrm>
+          <a:prstGeom prst="can">
+            <a:avLst/>
+          </a:prstGeom>
+          <a:solidFill>
+            <a:schemeClr val="accent4">
+              <a:lumMod val="75000"/>
+            </a:schemeClr>
+          </a:solidFill>
+          <a:scene3d>
+            <a:camera prst="orthographicFront"/>
+            <a:lightRig rig="threePt" dir="t"/>
+          </a:scene3d>
+          <a:sp3d prstMaterial="matte"/>
+        </p:spPr>
+        <p:style>
+          <a:lnRef idx="2">
+            <a:schemeClr val="accent1">
+              <a:shade val="50000"/>
+            </a:schemeClr>
+          </a:lnRef>
+          <a:fillRef idx="1">
+            <a:schemeClr val="accent1"/>
+          </a:fillRef>
+          <a:effectRef idx="0">
+            <a:schemeClr val="accent1"/>
+          </a:effectRef>
+          <a:fontRef idx="minor">
+            <a:schemeClr val="lt1"/>
+          </a:fontRef>
+        </p:style>
+        <p:txBody>
+          <a:bodyPr rtlCol="0" anchor="ctr"/>
+          <a:lstStyle/>
+          <a:p>
+            <a:pPr algn="ctr"/>
+            <a:endParaRPr lang="en-US"/>
+          </a:p>
+        </p:txBody>
+      </p:sp>
+      <p:sp>
+        <p:nvSpPr>
+          <p:cNvPr id="8" name="Snip Single Corner Rectangle 7"/>
+          <p:cNvSpPr/>
+          <p:nvPr/>
+        </p:nvSpPr>
+        <p:spPr>
+          <a:xfrm>
+            <a:off x="6477000" y="4114800"/>
+            <a:ext cx="990600" cy="381000"/>
+          </a:xfrm>
+          <a:prstGeom prst="snip1Rect">
+            <a:avLst/>
+          </a:prstGeom>
+          <a:solidFill>
+            <a:srgbClr val="C00000"/>
+          </a:solidFill>
+          <a:scene3d>
+            <a:camera prst="orthographicFront"/>
+            <a:lightRig rig="threePt" dir="t"/>
+          </a:scene3d>
+          <a:sp3d>
+            <a:bevelT/>
+          </a:sp3d>
+        </p:spPr>
+        <p:style>
+          <a:lnRef idx="2">
+            <a:schemeClr val="accent1">
+              <a:shade val="50000"/>
+            </a:schemeClr>
+          </a:lnRef>
+          <a:fillRef idx="1">
+            <a:schemeClr val="accent1"/>
+          </a:fillRef>
+          <a:effectRef idx="0">
+            <a:schemeClr val="accent1"/>
+          </a:effectRef>
+          <a:fontRef idx="minor">
+            <a:schemeClr val="lt1"/>
+          </a:fontRef>
+        </p:style>
+        <p:txBody>
+          <a:bodyPr rtlCol="0" anchor="ctr"/>
+          <a:lstStyle/>
+          <a:p>
+            <a:pPr algn="ctr"/>
+            <a:endParaRPr lang="en-US"/>
+          </a:p>
+        </p:txBody>
+      </p:sp>
+      <p:cxnSp>
+        <p:nvCxnSpPr>
+          <p:cNvPr id="10" name="Straight Arrow Connector 9"/>
+          <p:cNvCxnSpPr>
+            <a:stCxn id="7" idx="2"/>
+          </p:cNvCxnSpPr>
+          <p:nvPr/>
+        </p:nvCxnSpPr>
+        <p:spPr>
+          <a:xfrm flipH="1">
+            <a:off x="5410200" y="3695700"/>
+            <a:ext cx="1066800" cy="419100"/>
+          </a:xfrm>
+          <a:prstGeom prst="straightConnector1">
+            <a:avLst/>
+          </a:prstGeom>
+          <a:ln>
+            <a:tailEnd type="arrow"/>
+          </a:ln>
+        </p:spPr>
+        <p:style>
+          <a:lnRef idx="1">
+            <a:schemeClr val="accent1"/>
+          </a:lnRef>
+          <a:fillRef idx="0">
+            <a:schemeClr val="accent1"/>
+          </a:fillRef>
+          <a:effectRef idx="0">
+            <a:schemeClr val="accent1"/>
+          </a:effectRef>
+          <a:fontRef idx="minor">
+            <a:schemeClr val="tx1"/>
+          </a:fontRef>
+        </p:style>
+      </p:cxnSp>
+      <p:cxnSp>
+        <p:nvCxnSpPr>
+          <p:cNvPr id="12" name="Straight Arrow Connector 11"/>
+          <p:cNvCxnSpPr/>
+          <p:nvPr/>
+        </p:nvCxnSpPr>
+        <p:spPr>
+          <a:xfrm flipH="1">
+            <a:off x="5410200" y="4305300"/>
+            <a:ext cx="1066800" cy="0"/>
+          </a:xfrm>
+          <a:prstGeom prst="straightConnector1">
+            <a:avLst/>
+          </a:prstGeom>
+          <a:ln>
+            <a:tailEnd type="arrow"/>
+          </a:ln>
+        </p:spPr>
+        <p:style>
+          <a:lnRef idx="1">
+            <a:schemeClr val="accent1"/>
+          </a:lnRef>
+          <a:fillRef idx="0">
+            <a:schemeClr val="accent1"/>
+          </a:fillRef>
+          <a:effectRef idx="0">
+            <a:schemeClr val="accent1"/>
+          </a:effectRef>
+          <a:fontRef idx="minor">
+            <a:schemeClr val="tx1"/>
+          </a:fontRef>
+        </p:style>
+      </p:cxnSp>
+      <p:cxnSp>
+        <p:nvCxnSpPr>
+          <p:cNvPr id="14" name="Straight Arrow Connector 13"/>
+          <p:cNvCxnSpPr>
+            <a:stCxn id="6" idx="2"/>
+          </p:cNvCxnSpPr>
+          <p:nvPr/>
+        </p:nvCxnSpPr>
+        <p:spPr>
+          <a:xfrm flipH="1">
+            <a:off x="5410200" y="5181600"/>
+            <a:ext cx="1066800" cy="0"/>
+          </a:xfrm>
+          <a:prstGeom prst="straightConnector1">
+            <a:avLst/>
+          </a:prstGeom>
+          <a:ln>
+            <a:headEnd type="arrow"/>
+            <a:tailEnd type="arrow"/>
+          </a:ln>
+        </p:spPr>
+        <p:style>
+          <a:lnRef idx="1">
+            <a:schemeClr val="accent1"/>
+          </a:lnRef>
+          <a:fillRef idx="0">
+            <a:schemeClr val="accent1"/>
+          </a:fillRef>
+          <a:effectRef idx="0">
+            <a:schemeClr val="accent1"/>
+          </a:effectRef>
+          <a:fontRef idx="minor">
+            <a:schemeClr val="tx1"/>
+          </a:fontRef>
+        </p:style>
+      </p:cxnSp>
+      <p:sp>
+        <p:nvSpPr>
+          <p:cNvPr id="15" name="Rounded Rectangle 14"/>
+          <p:cNvSpPr/>
+          <p:nvPr/>
+        </p:nvSpPr>
+        <p:spPr>
+          <a:xfrm>
+            <a:off x="6324600" y="2057400"/>
+            <a:ext cx="1295400" cy="685800"/>
+          </a:xfrm>
+          <a:prstGeom prst="roundRect">
+            <a:avLst/>
+          </a:prstGeom>
+          <a:solidFill>
+            <a:srgbClr val="00B050"/>
+          </a:solidFill>
+          <a:scene3d>
+            <a:camera prst="orthographicFront"/>
+            <a:lightRig rig="threePt" dir="t"/>
+          </a:scene3d>
+          <a:sp3d>
+            <a:bevelT/>
+          </a:sp3d>
+        </p:spPr>
+        <p:style>
+          <a:lnRef idx="2">
+            <a:schemeClr val="dk1"/>
+          </a:lnRef>
+          <a:fillRef idx="1">
+            <a:schemeClr val="lt1"/>
+          </a:fillRef>
+          <a:effectRef idx="0">
+            <a:schemeClr val="dk1"/>
+          </a:effectRef>
+          <a:fontRef idx="minor">
+            <a:schemeClr val="dk1"/>
+          </a:fontRef>
+        </p:style>
+        <p:txBody>
+          <a:bodyPr rtlCol="0" anchor="ctr"/>
+          <a:lstStyle/>
+          <a:p>
+            <a:pPr algn="ctr"/>
+            <a:r>
+              <a:rPr lang="en-US" dirty="0" smtClean="0"/>
+              <a:t>API/PNR Adapter</a:t>
+            </a:r>
+            <a:endParaRPr lang="en-US" dirty="0"/>
+          </a:p>
+        </p:txBody>
+      </p:sp>
+      <p:sp>
+        <p:nvSpPr>
+          <p:cNvPr id="16" name="Flowchart: Direct Access Storage 15"/>
+          <p:cNvSpPr/>
+          <p:nvPr/>
+        </p:nvSpPr>
+        <p:spPr>
+          <a:xfrm>
+            <a:off x="7924800" y="2261044"/>
+            <a:ext cx="609600" cy="253556"/>
+          </a:xfrm>
+          <a:prstGeom prst="flowChartMagneticDrum">
+            <a:avLst/>
+          </a:prstGeom>
+        </p:spPr>
+        <p:style>
+          <a:lnRef idx="2">
+            <a:schemeClr val="accent1">
+              <a:shade val="50000"/>
+            </a:schemeClr>
+          </a:lnRef>
+          <a:fillRef idx="1">
+            <a:schemeClr val="accent1"/>
+          </a:fillRef>
+          <a:effectRef idx="0">
+            <a:schemeClr val="accent1"/>
+          </a:effectRef>
+          <a:fontRef idx="minor">
+            <a:schemeClr val="lt1"/>
+          </a:fontRef>
+        </p:style>
+        <p:txBody>
+          <a:bodyPr rtlCol="0" anchor="ctr"/>
+          <a:lstStyle/>
+          <a:p>
+            <a:pPr algn="ctr"/>
+            <a:endParaRPr lang="en-US"/>
+          </a:p>
+        </p:txBody>
+      </p:sp>
+      <p:cxnSp>
+        <p:nvCxnSpPr>
+          <p:cNvPr id="18" name="Straight Arrow Connector 17"/>
+          <p:cNvCxnSpPr>
+            <a:stCxn id="16" idx="1"/>
+            <a:endCxn id="15" idx="3"/>
+          </p:cNvCxnSpPr>
+          <p:nvPr/>
+        </p:nvCxnSpPr>
+        <p:spPr>
+          <a:xfrm flipH="1">
+            <a:off x="7620000" y="2387822"/>
+            <a:ext cx="304800" cy="12478"/>
+          </a:xfrm>
+          <a:prstGeom prst="straightConnector1">
+            <a:avLst/>
+          </a:prstGeom>
+          <a:ln>
+            <a:tailEnd type="arrow"/>
+          </a:ln>
+        </p:spPr>
+        <p:style>
+          <a:lnRef idx="1">
+            <a:schemeClr val="accent1"/>
+          </a:lnRef>
+          <a:fillRef idx="0">
+            <a:schemeClr val="accent1"/>
+          </a:fillRef>
+          <a:effectRef idx="0">
+            <a:schemeClr val="accent1"/>
+          </a:effectRef>
+          <a:fontRef idx="minor">
+            <a:schemeClr val="tx1"/>
+          </a:fontRef>
+        </p:style>
+      </p:cxnSp>
+      <p:cxnSp>
+        <p:nvCxnSpPr>
+          <p:cNvPr id="20" name="Straight Arrow Connector 19"/>
+          <p:cNvCxnSpPr>
+            <a:stCxn id="15" idx="2"/>
+            <a:endCxn id="7" idx="3"/>
+          </p:cNvCxnSpPr>
+          <p:nvPr/>
+        </p:nvCxnSpPr>
+        <p:spPr>
+          <a:xfrm>
+            <a:off x="6972300" y="2743200"/>
+            <a:ext cx="0" cy="762000"/>
+          </a:xfrm>
+          <a:prstGeom prst="straightConnector1">
+            <a:avLst/>
+          </a:prstGeom>
+          <a:ln>
+            <a:tailEnd type="arrow"/>
+          </a:ln>
+        </p:spPr>
+        <p:style>
+          <a:lnRef idx="1">
+            <a:schemeClr val="accent1"/>
+          </a:lnRef>
+          <a:fillRef idx="0">
+            <a:schemeClr val="accent1"/>
+          </a:fillRef>
+          <a:effectRef idx="0">
+            <a:schemeClr val="accent1"/>
+          </a:effectRef>
+          <a:fontRef idx="minor">
+            <a:schemeClr val="tx1"/>
+          </a:fontRef>
+        </p:style>
+      </p:cxnSp>
+      <p:cxnSp>
+        <p:nvCxnSpPr>
+          <p:cNvPr id="27" name="Straight Arrow Connector 26"/>
+          <p:cNvCxnSpPr/>
+          <p:nvPr/>
+        </p:nvCxnSpPr>
+        <p:spPr>
+          <a:xfrm>
+            <a:off x="7086600" y="2743200"/>
+            <a:ext cx="0" cy="1371600"/>
+          </a:xfrm>
+          <a:prstGeom prst="straightConnector1">
+            <a:avLst/>
+          </a:prstGeom>
+          <a:ln>
+            <a:tailEnd type="arrow"/>
+          </a:ln>
+        </p:spPr>
+        <p:style>
+          <a:lnRef idx="1">
+            <a:schemeClr val="accent1"/>
+          </a:lnRef>
+          <a:fillRef idx="0">
+            <a:schemeClr val="accent1"/>
+          </a:fillRef>
+          <a:effectRef idx="0">
+            <a:schemeClr val="accent1"/>
+          </a:effectRef>
+          <a:fontRef idx="minor">
+            <a:schemeClr val="tx1"/>
+          </a:fontRef>
+        </p:style>
+      </p:cxnSp>
+      <p:sp>
+        <p:nvSpPr>
+          <p:cNvPr id="7" name="Snip Single Corner Rectangle 6"/>
+          <p:cNvSpPr/>
+          <p:nvPr/>
+        </p:nvSpPr>
+        <p:spPr>
+          <a:xfrm>
+            <a:off x="6477000" y="3505200"/>
+            <a:ext cx="990600" cy="381000"/>
+          </a:xfrm>
+          <a:prstGeom prst="snip1Rect">
+            <a:avLst/>
+          </a:prstGeom>
+          <a:solidFill>
+            <a:srgbClr val="C00000"/>
+          </a:solidFill>
+          <a:scene3d>
+            <a:camera prst="orthographicFront"/>
+            <a:lightRig rig="threePt" dir="t"/>
+          </a:scene3d>
+          <a:sp3d>
+            <a:bevelT/>
+          </a:sp3d>
+        </p:spPr>
+        <p:style>
+          <a:lnRef idx="2">
+            <a:schemeClr val="accent1">
+              <a:shade val="50000"/>
+            </a:schemeClr>
+          </a:lnRef>
+          <a:fillRef idx="1">
+            <a:schemeClr val="accent1"/>
+          </a:fillRef>
+          <a:effectRef idx="0">
+            <a:schemeClr val="accent1"/>
+          </a:effectRef>
+          <a:fontRef idx="minor">
+            <a:schemeClr val="lt1"/>
+          </a:fontRef>
+        </p:style>
+        <p:txBody>
+          <a:bodyPr rtlCol="0" anchor="ctr"/>
+          <a:lstStyle/>
+          <a:p>
+            <a:pPr algn="ctr"/>
+            <a:endParaRPr lang="en-US"/>
+          </a:p>
+        </p:txBody>
+      </p:sp>
+      <p:sp>
+        <p:nvSpPr>
+          <p:cNvPr id="30" name="Rounded Rectangle 29"/>
+          <p:cNvSpPr/>
+          <p:nvPr/>
+        </p:nvSpPr>
+        <p:spPr>
+          <a:xfrm>
+            <a:off x="2249786" y="3777558"/>
+            <a:ext cx="2438400" cy="533400"/>
+          </a:xfrm>
+          <a:prstGeom prst="roundRect">
+            <a:avLst/>
+          </a:prstGeom>
+        </p:spPr>
+        <p:style>
+          <a:lnRef idx="2">
+            <a:schemeClr val="accent1">
+              <a:shade val="50000"/>
+            </a:schemeClr>
+          </a:lnRef>
+          <a:fillRef idx="1">
+            <a:schemeClr val="accent1"/>
+          </a:fillRef>
+          <a:effectRef idx="0">
+            <a:schemeClr val="accent1"/>
+          </a:effectRef>
+          <a:fontRef idx="minor">
+            <a:schemeClr val="lt1"/>
+          </a:fontRef>
+        </p:style>
+        <p:txBody>
+          <a:bodyPr rtlCol="0" anchor="ctr"/>
+          <a:lstStyle/>
+          <a:p>
+            <a:pPr algn="ctr"/>
+            <a:r>
+              <a:rPr lang="en-US" dirty="0" smtClean="0"/>
+              <a:t>Workflow &amp; Schedule Management</a:t>
+            </a:r>
+            <a:endParaRPr lang="en-US" dirty="0"/>
+          </a:p>
+        </p:txBody>
+      </p:sp>
+      <p:sp>
+        <p:nvSpPr>
+          <p:cNvPr id="31" name="Rounded Rectangle 30"/>
+          <p:cNvSpPr/>
+          <p:nvPr/>
+        </p:nvSpPr>
+        <p:spPr>
+          <a:xfrm>
+            <a:off x="3276600" y="4485238"/>
+            <a:ext cx="1828800" cy="533400"/>
+          </a:xfrm>
+          <a:prstGeom prst="roundRect">
+            <a:avLst/>
+          </a:prstGeom>
+        </p:spPr>
+        <p:style>
+          <a:lnRef idx="2">
+            <a:schemeClr val="accent1">
+              <a:shade val="50000"/>
+            </a:schemeClr>
+          </a:lnRef>
+          <a:fillRef idx="1">
+            <a:schemeClr val="accent1"/>
+          </a:fillRef>
+          <a:effectRef idx="0">
+            <a:schemeClr val="accent1"/>
+          </a:effectRef>
+          <a:fontRef idx="minor">
+            <a:schemeClr val="lt1"/>
+          </a:fontRef>
+        </p:style>
+        <p:txBody>
+          <a:bodyPr rtlCol="0" anchor="ctr"/>
+          <a:lstStyle/>
+          <a:p>
+            <a:pPr algn="ctr"/>
+            <a:r>
+              <a:rPr lang="en-US" dirty="0" smtClean="0"/>
+              <a:t>Administration</a:t>
+            </a:r>
+            <a:endParaRPr lang="en-US" dirty="0"/>
+          </a:p>
+        </p:txBody>
+      </p:sp>
+      <p:sp>
+        <p:nvSpPr>
+          <p:cNvPr id="32" name="Rounded Rectangle 31"/>
+          <p:cNvSpPr/>
+          <p:nvPr/>
+        </p:nvSpPr>
+        <p:spPr>
+          <a:xfrm>
+            <a:off x="1752600" y="4485238"/>
+            <a:ext cx="1371600" cy="620916"/>
+          </a:xfrm>
+          <a:prstGeom prst="roundRect">
+            <a:avLst/>
+          </a:prstGeom>
+        </p:spPr>
+        <p:style>
+          <a:lnRef idx="2">
+            <a:schemeClr val="accent1">
+              <a:shade val="50000"/>
+            </a:schemeClr>
+          </a:lnRef>
+          <a:fillRef idx="1">
+            <a:schemeClr val="accent1"/>
+          </a:fillRef>
+          <a:effectRef idx="0">
+            <a:schemeClr val="accent1"/>
+          </a:effectRef>
+          <a:fontRef idx="minor">
+            <a:schemeClr val="lt1"/>
+          </a:fontRef>
+        </p:style>
+        <p:txBody>
+          <a:bodyPr rtlCol="0" anchor="ctr"/>
+          <a:lstStyle/>
+          <a:p>
+            <a:pPr algn="ctr"/>
+            <a:r>
+              <a:rPr lang="en-US" dirty="0" smtClean="0"/>
+              <a:t>Risk Assessment</a:t>
+            </a:r>
+            <a:endParaRPr lang="en-US" dirty="0"/>
+          </a:p>
+        </p:txBody>
+      </p:sp>
+      <p:sp>
+        <p:nvSpPr>
+          <p:cNvPr id="33" name="Rounded Rectangle 32"/>
+          <p:cNvSpPr/>
+          <p:nvPr/>
+        </p:nvSpPr>
+        <p:spPr>
+          <a:xfrm>
+            <a:off x="1828800" y="5334000"/>
+            <a:ext cx="1295400" cy="533400"/>
+          </a:xfrm>
+          <a:prstGeom prst="roundRect">
+            <a:avLst/>
+          </a:prstGeom>
+        </p:spPr>
+        <p:style>
+          <a:lnRef idx="2">
+            <a:schemeClr val="accent1">
+              <a:shade val="50000"/>
+            </a:schemeClr>
+          </a:lnRef>
+          <a:fillRef idx="1">
+            <a:schemeClr val="accent1"/>
+          </a:fillRef>
+          <a:effectRef idx="0">
+            <a:schemeClr val="accent1"/>
+          </a:effectRef>
+          <a:fontRef idx="minor">
+            <a:schemeClr val="lt1"/>
+          </a:fontRef>
+        </p:style>
+        <p:txBody>
+          <a:bodyPr rtlCol="0" anchor="ctr"/>
+          <a:lstStyle/>
+          <a:p>
+            <a:pPr algn="ctr"/>
+            <a:r>
+              <a:rPr lang="en-US" dirty="0" smtClean="0"/>
+              <a:t>Query Builder</a:t>
+            </a:r>
+            <a:endParaRPr lang="en-US" dirty="0"/>
+          </a:p>
+        </p:txBody>
+      </p:sp>
+      <p:sp>
+        <p:nvSpPr>
+          <p:cNvPr id="34" name="Rounded Rectangle 33"/>
+          <p:cNvSpPr/>
+          <p:nvPr/>
+        </p:nvSpPr>
+        <p:spPr>
+          <a:xfrm>
+            <a:off x="3468986" y="5334000"/>
+            <a:ext cx="1636414" cy="533400"/>
+          </a:xfrm>
+          <a:prstGeom prst="roundRect">
+            <a:avLst/>
+          </a:prstGeom>
+        </p:spPr>
+        <p:style>
+          <a:lnRef idx="2">
+            <a:schemeClr val="accent1">
+              <a:shade val="50000"/>
+            </a:schemeClr>
+          </a:lnRef>
+          <a:fillRef idx="1">
+            <a:schemeClr val="accent1"/>
+          </a:fillRef>
+          <a:effectRef idx="0">
+            <a:schemeClr val="accent1"/>
+          </a:effectRef>
+          <a:fontRef idx="minor">
+            <a:schemeClr val="lt1"/>
+          </a:fontRef>
+        </p:style>
+        <p:txBody>
+          <a:bodyPr rtlCol="0" anchor="ctr"/>
+          <a:lstStyle/>
+          <a:p>
+            <a:pPr algn="ctr"/>
+            <a:r>
+              <a:rPr lang="en-US" dirty="0" smtClean="0"/>
+              <a:t>UDR Service</a:t>
+            </a:r>
+            <a:endParaRPr lang="en-US" dirty="0"/>
+          </a:p>
+        </p:txBody>
+      </p:sp>
+    </p:spTree>
+    <p:extLst>
+      <p:ext uri="{BB962C8B-B14F-4D97-AF65-F5344CB8AC3E}">
+        <p14:creationId xmlns:p14="http://schemas.microsoft.com/office/powerpoint/2010/main" val="3676908147"/>
       </p:ext>
     </p:extLst>
   </p:cSld>

</xml_diff>